<commit_message>
beep boop die marah ist für mich tot
</commit_message>
<xml_diff>
--- a/presentation 2/slides.pptx
+++ b/presentation 2/slides.pptx
@@ -23735,7 +23735,18 @@
             </a:r>
           </a:p>
           <a:p>
-            <a:pPr lvl="1"/>
+            <a:r>
+              <a:rPr lang="en-US" dirty="0"/>
+              <a:t>Mini </a:t>
+            </a:r>
+            <a:r>
+              <a:rPr lang="en-US" dirty="0" err="1"/>
+              <a:t>WebGPU</a:t>
+            </a:r>
+            <a:r>
+              <a:rPr lang="en-US"/>
+              <a:t> Framework</a:t>
+            </a:r>
             <a:endParaRPr lang="en-US" dirty="0"/>
           </a:p>
           <a:p>

</xml_diff>

<commit_message>
ich slide in mein
</commit_message>
<xml_diff>
--- a/presentation 2/slides.pptx
+++ b/presentation 2/slides.pptx
@@ -23933,6 +23933,12 @@
           <a:p>
             <a:r>
               <a:rPr lang="en-US" dirty="0"/>
+              <a:t>Memory layout &amp; management</a:t>
+            </a:r>
+          </a:p>
+          <a:p>
+            <a:r>
+              <a:rPr lang="en-US" dirty="0"/>
               <a:t>Protein files invalid</a:t>
             </a:r>
           </a:p>

</xml_diff>